<commit_message>
-more figures -more references -more content -start discussion
</commit_message>
<xml_diff>
--- a/latex/figures/figures.pptx
+++ b/latex/figures/figures.pptx
@@ -4,9 +4,14 @@
   <p:sldMasterIdLst>
     <p:sldMasterId id="2147483648" r:id="rId1"/>
   </p:sldMasterIdLst>
+  <p:notesMasterIdLst>
+    <p:notesMasterId r:id="rId6"/>
+  </p:notesMasterIdLst>
   <p:sldIdLst>
     <p:sldId id="256" r:id="rId2"/>
     <p:sldId id="257" r:id="rId3"/>
+    <p:sldId id="258" r:id="rId4"/>
+    <p:sldId id="259" r:id="rId5"/>
   </p:sldIdLst>
   <p:sldSz cx="9144000" cy="6858000" type="screen4x3"/>
   <p:notesSz cx="6858000" cy="9144000"/>
@@ -108,6 +113,353 @@
 </p:presentation>
 </file>
 
+<file path=ppt/notesMasters/notesMaster1.xml><?xml version="1.0" encoding="utf-8"?>
+<p:notesMaster xmlns:a="http://schemas.openxmlformats.org/drawingml/2006/main" xmlns:r="http://schemas.openxmlformats.org/officeDocument/2006/relationships" xmlns:p="http://schemas.openxmlformats.org/presentationml/2006/main">
+  <p:cSld>
+    <p:bg>
+      <p:bgRef idx="1001">
+        <a:schemeClr val="bg1"/>
+      </p:bgRef>
+    </p:bg>
+    <p:spTree>
+      <p:nvGrpSpPr>
+        <p:cNvPr id="1" name=""/>
+        <p:cNvGrpSpPr/>
+        <p:nvPr/>
+      </p:nvGrpSpPr>
+      <p:grpSpPr>
+        <a:xfrm>
+          <a:off x="0" y="0"/>
+          <a:ext cx="0" cy="0"/>
+          <a:chOff x="0" y="0"/>
+          <a:chExt cx="0" cy="0"/>
+        </a:xfrm>
+      </p:grpSpPr>
+      <p:sp>
+        <p:nvSpPr>
+          <p:cNvPr id="2" name="Header Placeholder 1"/>
+          <p:cNvSpPr>
+            <a:spLocks noGrp="1"/>
+          </p:cNvSpPr>
+          <p:nvPr>
+            <p:ph type="hdr" sz="quarter"/>
+          </p:nvPr>
+        </p:nvSpPr>
+        <p:spPr>
+          <a:xfrm>
+            <a:off x="0" y="0"/>
+            <a:ext cx="2971800" cy="457200"/>
+          </a:xfrm>
+          <a:prstGeom prst="rect">
+            <a:avLst/>
+          </a:prstGeom>
+        </p:spPr>
+        <p:txBody>
+          <a:bodyPr vert="horz" lIns="91440" tIns="45720" rIns="91440" bIns="45720" rtlCol="0"/>
+          <a:lstStyle>
+            <a:lvl1pPr algn="l">
+              <a:defRPr sz="1200"/>
+            </a:lvl1pPr>
+          </a:lstStyle>
+          <a:p>
+            <a:endParaRPr lang="en-US"/>
+          </a:p>
+        </p:txBody>
+      </p:sp>
+      <p:sp>
+        <p:nvSpPr>
+          <p:cNvPr id="3" name="Date Placeholder 2"/>
+          <p:cNvSpPr>
+            <a:spLocks noGrp="1"/>
+          </p:cNvSpPr>
+          <p:nvPr>
+            <p:ph type="dt" idx="1"/>
+          </p:nvPr>
+        </p:nvSpPr>
+        <p:spPr>
+          <a:xfrm>
+            <a:off x="3884613" y="0"/>
+            <a:ext cx="2971800" cy="457200"/>
+          </a:xfrm>
+          <a:prstGeom prst="rect">
+            <a:avLst/>
+          </a:prstGeom>
+        </p:spPr>
+        <p:txBody>
+          <a:bodyPr vert="horz" lIns="91440" tIns="45720" rIns="91440" bIns="45720" rtlCol="0"/>
+          <a:lstStyle>
+            <a:lvl1pPr algn="r">
+              <a:defRPr sz="1200"/>
+            </a:lvl1pPr>
+          </a:lstStyle>
+          <a:p>
+            <a:fld id="{AAC99F76-CD5B-4362-8864-1A7FF77C9707}" type="datetimeFigureOut">
+              <a:rPr lang="en-US" smtClean="0"/>
+              <a:t>03-Aug-13</a:t>
+            </a:fld>
+            <a:endParaRPr lang="en-US"/>
+          </a:p>
+        </p:txBody>
+      </p:sp>
+      <p:sp>
+        <p:nvSpPr>
+          <p:cNvPr id="4" name="Slide Image Placeholder 3"/>
+          <p:cNvSpPr>
+            <a:spLocks noGrp="1" noRot="1" noChangeAspect="1"/>
+          </p:cNvSpPr>
+          <p:nvPr>
+            <p:ph type="sldImg" idx="2"/>
+          </p:nvPr>
+        </p:nvSpPr>
+        <p:spPr>
+          <a:xfrm>
+            <a:off x="1143000" y="685800"/>
+            <a:ext cx="4572000" cy="3429000"/>
+          </a:xfrm>
+          <a:prstGeom prst="rect">
+            <a:avLst/>
+          </a:prstGeom>
+          <a:noFill/>
+          <a:ln w="12700">
+            <a:solidFill>
+              <a:prstClr val="black"/>
+            </a:solidFill>
+          </a:ln>
+        </p:spPr>
+        <p:txBody>
+          <a:bodyPr vert="horz" lIns="91440" tIns="45720" rIns="91440" bIns="45720" rtlCol="0" anchor="ctr"/>
+          <a:lstStyle/>
+          <a:p>
+            <a:endParaRPr lang="en-US"/>
+          </a:p>
+        </p:txBody>
+      </p:sp>
+      <p:sp>
+        <p:nvSpPr>
+          <p:cNvPr id="5" name="Notes Placeholder 4"/>
+          <p:cNvSpPr>
+            <a:spLocks noGrp="1"/>
+          </p:cNvSpPr>
+          <p:nvPr>
+            <p:ph type="body" sz="quarter" idx="3"/>
+          </p:nvPr>
+        </p:nvSpPr>
+        <p:spPr>
+          <a:xfrm>
+            <a:off x="685800" y="4343400"/>
+            <a:ext cx="5486400" cy="4114800"/>
+          </a:xfrm>
+          <a:prstGeom prst="rect">
+            <a:avLst/>
+          </a:prstGeom>
+        </p:spPr>
+        <p:txBody>
+          <a:bodyPr vert="horz" lIns="91440" tIns="45720" rIns="91440" bIns="45720" rtlCol="0">
+            <a:normAutofit/>
+          </a:bodyPr>
+          <a:lstStyle/>
+          <a:p>
+            <a:pPr lvl="0"/>
+            <a:r>
+              <a:rPr lang="en-US" smtClean="0"/>
+              <a:t>Click to edit Master text styles</a:t>
+            </a:r>
+          </a:p>
+          <a:p>
+            <a:pPr lvl="1"/>
+            <a:r>
+              <a:rPr lang="en-US" smtClean="0"/>
+              <a:t>Second level</a:t>
+            </a:r>
+          </a:p>
+          <a:p>
+            <a:pPr lvl="2"/>
+            <a:r>
+              <a:rPr lang="en-US" smtClean="0"/>
+              <a:t>Third level</a:t>
+            </a:r>
+          </a:p>
+          <a:p>
+            <a:pPr lvl="3"/>
+            <a:r>
+              <a:rPr lang="en-US" smtClean="0"/>
+              <a:t>Fourth level</a:t>
+            </a:r>
+          </a:p>
+          <a:p>
+            <a:pPr lvl="4"/>
+            <a:r>
+              <a:rPr lang="en-US" smtClean="0"/>
+              <a:t>Fifth level</a:t>
+            </a:r>
+            <a:endParaRPr lang="en-US"/>
+          </a:p>
+        </p:txBody>
+      </p:sp>
+      <p:sp>
+        <p:nvSpPr>
+          <p:cNvPr id="6" name="Footer Placeholder 5"/>
+          <p:cNvSpPr>
+            <a:spLocks noGrp="1"/>
+          </p:cNvSpPr>
+          <p:nvPr>
+            <p:ph type="ftr" sz="quarter" idx="4"/>
+          </p:nvPr>
+        </p:nvSpPr>
+        <p:spPr>
+          <a:xfrm>
+            <a:off x="0" y="8685213"/>
+            <a:ext cx="2971800" cy="457200"/>
+          </a:xfrm>
+          <a:prstGeom prst="rect">
+            <a:avLst/>
+          </a:prstGeom>
+        </p:spPr>
+        <p:txBody>
+          <a:bodyPr vert="horz" lIns="91440" tIns="45720" rIns="91440" bIns="45720" rtlCol="0" anchor="b"/>
+          <a:lstStyle>
+            <a:lvl1pPr algn="l">
+              <a:defRPr sz="1200"/>
+            </a:lvl1pPr>
+          </a:lstStyle>
+          <a:p>
+            <a:endParaRPr lang="en-US"/>
+          </a:p>
+        </p:txBody>
+      </p:sp>
+      <p:sp>
+        <p:nvSpPr>
+          <p:cNvPr id="7" name="Slide Number Placeholder 6"/>
+          <p:cNvSpPr>
+            <a:spLocks noGrp="1"/>
+          </p:cNvSpPr>
+          <p:nvPr>
+            <p:ph type="sldNum" sz="quarter" idx="5"/>
+          </p:nvPr>
+        </p:nvSpPr>
+        <p:spPr>
+          <a:xfrm>
+            <a:off x="3884613" y="8685213"/>
+            <a:ext cx="2971800" cy="457200"/>
+          </a:xfrm>
+          <a:prstGeom prst="rect">
+            <a:avLst/>
+          </a:prstGeom>
+        </p:spPr>
+        <p:txBody>
+          <a:bodyPr vert="horz" lIns="91440" tIns="45720" rIns="91440" bIns="45720" rtlCol="0" anchor="b"/>
+          <a:lstStyle>
+            <a:lvl1pPr algn="r">
+              <a:defRPr sz="1200"/>
+            </a:lvl1pPr>
+          </a:lstStyle>
+          <a:p>
+            <a:fld id="{57385444-732E-4196-8780-F1396E368759}" type="slidenum">
+              <a:rPr lang="en-US" smtClean="0"/>
+              <a:t>‹#›</a:t>
+            </a:fld>
+            <a:endParaRPr lang="en-US"/>
+          </a:p>
+        </p:txBody>
+      </p:sp>
+    </p:spTree>
+  </p:cSld>
+  <p:clrMap bg1="lt1" tx1="dk1" bg2="lt2" tx2="dk2" accent1="accent1" accent2="accent2" accent3="accent3" accent4="accent4" accent5="accent5" accent6="accent6" hlink="hlink" folHlink="folHlink"/>
+  <p:notesStyle>
+    <a:lvl1pPr marL="0" algn="l" defTabSz="914400" rtl="0" eaLnBrk="1" latinLnBrk="0" hangingPunct="1">
+      <a:defRPr sz="1200" kern="1200">
+        <a:solidFill>
+          <a:schemeClr val="tx1"/>
+        </a:solidFill>
+        <a:latin typeface="+mn-lt"/>
+        <a:ea typeface="+mn-ea"/>
+        <a:cs typeface="+mn-cs"/>
+      </a:defRPr>
+    </a:lvl1pPr>
+    <a:lvl2pPr marL="457200" algn="l" defTabSz="914400" rtl="0" eaLnBrk="1" latinLnBrk="0" hangingPunct="1">
+      <a:defRPr sz="1200" kern="1200">
+        <a:solidFill>
+          <a:schemeClr val="tx1"/>
+        </a:solidFill>
+        <a:latin typeface="+mn-lt"/>
+        <a:ea typeface="+mn-ea"/>
+        <a:cs typeface="+mn-cs"/>
+      </a:defRPr>
+    </a:lvl2pPr>
+    <a:lvl3pPr marL="914400" algn="l" defTabSz="914400" rtl="0" eaLnBrk="1" latinLnBrk="0" hangingPunct="1">
+      <a:defRPr sz="1200" kern="1200">
+        <a:solidFill>
+          <a:schemeClr val="tx1"/>
+        </a:solidFill>
+        <a:latin typeface="+mn-lt"/>
+        <a:ea typeface="+mn-ea"/>
+        <a:cs typeface="+mn-cs"/>
+      </a:defRPr>
+    </a:lvl3pPr>
+    <a:lvl4pPr marL="1371600" algn="l" defTabSz="914400" rtl="0" eaLnBrk="1" latinLnBrk="0" hangingPunct="1">
+      <a:defRPr sz="1200" kern="1200">
+        <a:solidFill>
+          <a:schemeClr val="tx1"/>
+        </a:solidFill>
+        <a:latin typeface="+mn-lt"/>
+        <a:ea typeface="+mn-ea"/>
+        <a:cs typeface="+mn-cs"/>
+      </a:defRPr>
+    </a:lvl4pPr>
+    <a:lvl5pPr marL="1828800" algn="l" defTabSz="914400" rtl="0" eaLnBrk="1" latinLnBrk="0" hangingPunct="1">
+      <a:defRPr sz="1200" kern="1200">
+        <a:solidFill>
+          <a:schemeClr val="tx1"/>
+        </a:solidFill>
+        <a:latin typeface="+mn-lt"/>
+        <a:ea typeface="+mn-ea"/>
+        <a:cs typeface="+mn-cs"/>
+      </a:defRPr>
+    </a:lvl5pPr>
+    <a:lvl6pPr marL="2286000" algn="l" defTabSz="914400" rtl="0" eaLnBrk="1" latinLnBrk="0" hangingPunct="1">
+      <a:defRPr sz="1200" kern="1200">
+        <a:solidFill>
+          <a:schemeClr val="tx1"/>
+        </a:solidFill>
+        <a:latin typeface="+mn-lt"/>
+        <a:ea typeface="+mn-ea"/>
+        <a:cs typeface="+mn-cs"/>
+      </a:defRPr>
+    </a:lvl6pPr>
+    <a:lvl7pPr marL="2743200" algn="l" defTabSz="914400" rtl="0" eaLnBrk="1" latinLnBrk="0" hangingPunct="1">
+      <a:defRPr sz="1200" kern="1200">
+        <a:solidFill>
+          <a:schemeClr val="tx1"/>
+        </a:solidFill>
+        <a:latin typeface="+mn-lt"/>
+        <a:ea typeface="+mn-ea"/>
+        <a:cs typeface="+mn-cs"/>
+      </a:defRPr>
+    </a:lvl7pPr>
+    <a:lvl8pPr marL="3200400" algn="l" defTabSz="914400" rtl="0" eaLnBrk="1" latinLnBrk="0" hangingPunct="1">
+      <a:defRPr sz="1200" kern="1200">
+        <a:solidFill>
+          <a:schemeClr val="tx1"/>
+        </a:solidFill>
+        <a:latin typeface="+mn-lt"/>
+        <a:ea typeface="+mn-ea"/>
+        <a:cs typeface="+mn-cs"/>
+      </a:defRPr>
+    </a:lvl8pPr>
+    <a:lvl9pPr marL="3657600" algn="l" defTabSz="914400" rtl="0" eaLnBrk="1" latinLnBrk="0" hangingPunct="1">
+      <a:defRPr sz="1200" kern="1200">
+        <a:solidFill>
+          <a:schemeClr val="tx1"/>
+        </a:solidFill>
+        <a:latin typeface="+mn-lt"/>
+        <a:ea typeface="+mn-ea"/>
+        <a:cs typeface="+mn-cs"/>
+      </a:defRPr>
+    </a:lvl9pPr>
+  </p:notesStyle>
+</p:notesMaster>
+</file>
+
 <file path=ppt/slideLayouts/slideLayout1.xml><?xml version="1.0" encoding="utf-8"?>
 <p:sldLayout xmlns:a="http://schemas.openxmlformats.org/drawingml/2006/main" xmlns:r="http://schemas.openxmlformats.org/officeDocument/2006/relationships" xmlns:p="http://schemas.openxmlformats.org/presentationml/2006/main" type="title" preserve="1">
   <p:cSld name="Title Slide">
@@ -290,7 +642,7 @@
             <a:fld id="{EE90A307-9D6B-4818-ACD2-10B28FBDD19F}" type="datetimeFigureOut">
               <a:rPr lang="en-US" smtClean="0"/>
               <a:pPr/>
-              <a:t>27-Jul-13</a:t>
+              <a:t>03-Aug-13</a:t>
             </a:fld>
             <a:endParaRPr lang="en-US"/>
           </a:p>
@@ -457,7 +809,7 @@
             <a:fld id="{EE90A307-9D6B-4818-ACD2-10B28FBDD19F}" type="datetimeFigureOut">
               <a:rPr lang="en-US" smtClean="0"/>
               <a:pPr/>
-              <a:t>27-Jul-13</a:t>
+              <a:t>03-Aug-13</a:t>
             </a:fld>
             <a:endParaRPr lang="en-US"/>
           </a:p>
@@ -634,7 +986,7 @@
             <a:fld id="{EE90A307-9D6B-4818-ACD2-10B28FBDD19F}" type="datetimeFigureOut">
               <a:rPr lang="en-US" smtClean="0"/>
               <a:pPr/>
-              <a:t>27-Jul-13</a:t>
+              <a:t>03-Aug-13</a:t>
             </a:fld>
             <a:endParaRPr lang="en-US"/>
           </a:p>
@@ -801,7 +1153,7 @@
             <a:fld id="{EE90A307-9D6B-4818-ACD2-10B28FBDD19F}" type="datetimeFigureOut">
               <a:rPr lang="en-US" smtClean="0"/>
               <a:pPr/>
-              <a:t>27-Jul-13</a:t>
+              <a:t>03-Aug-13</a:t>
             </a:fld>
             <a:endParaRPr lang="en-US"/>
           </a:p>
@@ -1044,7 +1396,7 @@
             <a:fld id="{EE90A307-9D6B-4818-ACD2-10B28FBDD19F}" type="datetimeFigureOut">
               <a:rPr lang="en-US" smtClean="0"/>
               <a:pPr/>
-              <a:t>27-Jul-13</a:t>
+              <a:t>03-Aug-13</a:t>
             </a:fld>
             <a:endParaRPr lang="en-US"/>
           </a:p>
@@ -1329,7 +1681,7 @@
             <a:fld id="{EE90A307-9D6B-4818-ACD2-10B28FBDD19F}" type="datetimeFigureOut">
               <a:rPr lang="en-US" smtClean="0"/>
               <a:pPr/>
-              <a:t>27-Jul-13</a:t>
+              <a:t>03-Aug-13</a:t>
             </a:fld>
             <a:endParaRPr lang="en-US"/>
           </a:p>
@@ -1748,7 +2100,7 @@
             <a:fld id="{EE90A307-9D6B-4818-ACD2-10B28FBDD19F}" type="datetimeFigureOut">
               <a:rPr lang="en-US" smtClean="0"/>
               <a:pPr/>
-              <a:t>27-Jul-13</a:t>
+              <a:t>03-Aug-13</a:t>
             </a:fld>
             <a:endParaRPr lang="en-US"/>
           </a:p>
@@ -1863,7 +2215,7 @@
             <a:fld id="{EE90A307-9D6B-4818-ACD2-10B28FBDD19F}" type="datetimeFigureOut">
               <a:rPr lang="en-US" smtClean="0"/>
               <a:pPr/>
-              <a:t>27-Jul-13</a:t>
+              <a:t>03-Aug-13</a:t>
             </a:fld>
             <a:endParaRPr lang="en-US"/>
           </a:p>
@@ -1955,7 +2307,7 @@
             <a:fld id="{EE90A307-9D6B-4818-ACD2-10B28FBDD19F}" type="datetimeFigureOut">
               <a:rPr lang="en-US" smtClean="0"/>
               <a:pPr/>
-              <a:t>27-Jul-13</a:t>
+              <a:t>03-Aug-13</a:t>
             </a:fld>
             <a:endParaRPr lang="en-US"/>
           </a:p>
@@ -2229,7 +2581,7 @@
             <a:fld id="{EE90A307-9D6B-4818-ACD2-10B28FBDD19F}" type="datetimeFigureOut">
               <a:rPr lang="en-US" smtClean="0"/>
               <a:pPr/>
-              <a:t>27-Jul-13</a:t>
+              <a:t>03-Aug-13</a:t>
             </a:fld>
             <a:endParaRPr lang="en-US"/>
           </a:p>
@@ -2479,7 +2831,7 @@
             <a:fld id="{EE90A307-9D6B-4818-ACD2-10B28FBDD19F}" type="datetimeFigureOut">
               <a:rPr lang="en-US" smtClean="0"/>
               <a:pPr/>
-              <a:t>27-Jul-13</a:t>
+              <a:t>03-Aug-13</a:t>
             </a:fld>
             <a:endParaRPr lang="en-US"/>
           </a:p>
@@ -2689,7 +3041,7 @@
             <a:fld id="{EE90A307-9D6B-4818-ACD2-10B28FBDD19F}" type="datetimeFigureOut">
               <a:rPr lang="en-US" smtClean="0"/>
               <a:pPr/>
-              <a:t>27-Jul-13</a:t>
+              <a:t>03-Aug-13</a:t>
             </a:fld>
             <a:endParaRPr lang="en-US"/>
           </a:p>
@@ -3325,11 +3677,7 @@
           <a:p>
             <a:r>
               <a:rPr lang="en-US" b="1" dirty="0" smtClean="0"/>
-              <a:t>b</a:t>
-            </a:r>
-            <a:r>
-              <a:rPr lang="en-US" b="1" dirty="0" smtClean="0"/>
-              <a:t>)</a:t>
+              <a:t>b)</a:t>
             </a:r>
             <a:endParaRPr lang="en-US" b="1" dirty="0"/>
           </a:p>
@@ -3359,16 +3707,298 @@
           <a:p>
             <a:r>
               <a:rPr lang="en-US" b="1" dirty="0" smtClean="0"/>
-              <a:t>c</a:t>
-            </a:r>
-            <a:r>
-              <a:rPr lang="en-US" b="1" dirty="0" smtClean="0"/>
-              <a:t>)</a:t>
+              <a:t>c)</a:t>
             </a:r>
             <a:endParaRPr lang="en-US" b="1" dirty="0"/>
           </a:p>
         </p:txBody>
       </p:sp>
+    </p:spTree>
+  </p:cSld>
+  <p:clrMapOvr>
+    <a:masterClrMapping/>
+  </p:clrMapOvr>
+</p:sld>
+</file>
+
+<file path=ppt/slides/slide3.xml><?xml version="1.0" encoding="utf-8"?>
+<p:sld xmlns:a="http://schemas.openxmlformats.org/drawingml/2006/main" xmlns:r="http://schemas.openxmlformats.org/officeDocument/2006/relationships" xmlns:p="http://schemas.openxmlformats.org/presentationml/2006/main">
+  <p:cSld>
+    <p:spTree>
+      <p:nvGrpSpPr>
+        <p:cNvPr id="1" name=""/>
+        <p:cNvGrpSpPr/>
+        <p:nvPr/>
+      </p:nvGrpSpPr>
+      <p:grpSpPr>
+        <a:xfrm>
+          <a:off x="0" y="0"/>
+          <a:ext cx="0" cy="0"/>
+          <a:chOff x="0" y="0"/>
+          <a:chExt cx="0" cy="0"/>
+        </a:xfrm>
+      </p:grpSpPr>
+      <p:pic>
+        <p:nvPicPr>
+          <p:cNvPr id="1026" name="Picture 2" descr="C:\Users\woodstock\Documents\grad\Thesis\drafts\book\figures\prediction_stats_kl_layerF.png"/>
+          <p:cNvPicPr>
+            <a:picLocks noChangeAspect="1" noChangeArrowheads="1"/>
+          </p:cNvPicPr>
+          <p:nvPr/>
+        </p:nvPicPr>
+        <p:blipFill>
+          <a:blip r:embed="rId2" cstate="print"/>
+          <a:srcRect/>
+          <a:stretch>
+            <a:fillRect/>
+          </a:stretch>
+        </p:blipFill>
+        <p:spPr bwMode="auto">
+          <a:xfrm>
+            <a:off x="136806" y="152400"/>
+            <a:ext cx="3673194" cy="3352800"/>
+          </a:xfrm>
+          <a:prstGeom prst="rect">
+            <a:avLst/>
+          </a:prstGeom>
+          <a:noFill/>
+        </p:spPr>
+      </p:pic>
+      <p:pic>
+        <p:nvPicPr>
+          <p:cNvPr id="1027" name="Picture 3" descr="C:\Users\woodstock\Documents\grad\Thesis\drafts\book\figures\prediction_stats_kl_layerZ.png"/>
+          <p:cNvPicPr>
+            <a:picLocks noChangeAspect="1" noChangeArrowheads="1"/>
+          </p:cNvPicPr>
+          <p:nvPr/>
+        </p:nvPicPr>
+        <p:blipFill>
+          <a:blip r:embed="rId3" cstate="print"/>
+          <a:srcRect/>
+          <a:stretch>
+            <a:fillRect/>
+          </a:stretch>
+        </p:blipFill>
+        <p:spPr bwMode="auto">
+          <a:xfrm>
+            <a:off x="4953000" y="76200"/>
+            <a:ext cx="3786968" cy="3505200"/>
+          </a:xfrm>
+          <a:prstGeom prst="rect">
+            <a:avLst/>
+          </a:prstGeom>
+          <a:noFill/>
+        </p:spPr>
+      </p:pic>
+      <p:pic>
+        <p:nvPicPr>
+          <p:cNvPr id="1028" name="Picture 4" descr="C:\Users\woodstock\Documents\grad\Thesis\drafts\book\figures\prediction_stats_kl_tns-layerF.png"/>
+          <p:cNvPicPr>
+            <a:picLocks noChangeAspect="1" noChangeArrowheads="1"/>
+          </p:cNvPicPr>
+          <p:nvPr/>
+        </p:nvPicPr>
+        <p:blipFill>
+          <a:blip r:embed="rId4" cstate="print"/>
+          <a:srcRect l="17169" r="22330"/>
+          <a:stretch>
+            <a:fillRect/>
+          </a:stretch>
+        </p:blipFill>
+        <p:spPr bwMode="auto">
+          <a:xfrm>
+            <a:off x="0" y="3581400"/>
+            <a:ext cx="3733800" cy="2983256"/>
+          </a:xfrm>
+          <a:prstGeom prst="rect">
+            <a:avLst/>
+          </a:prstGeom>
+          <a:noFill/>
+        </p:spPr>
+      </p:pic>
+      <p:pic>
+        <p:nvPicPr>
+          <p:cNvPr id="1029" name="Picture 5" descr="C:\Users\woodstock\Documents\grad\Thesis\drafts\book\figures\prediction_stats_kl_tns-layerZ.png"/>
+          <p:cNvPicPr>
+            <a:picLocks noChangeAspect="1" noChangeArrowheads="1"/>
+          </p:cNvPicPr>
+          <p:nvPr/>
+        </p:nvPicPr>
+        <p:blipFill>
+          <a:blip r:embed="rId5" cstate="print"/>
+          <a:srcRect l="17169" r="22330"/>
+          <a:stretch>
+            <a:fillRect/>
+          </a:stretch>
+        </p:blipFill>
+        <p:spPr bwMode="auto">
+          <a:xfrm>
+            <a:off x="4876800" y="3581400"/>
+            <a:ext cx="3810000" cy="3044139"/>
+          </a:xfrm>
+          <a:prstGeom prst="rect">
+            <a:avLst/>
+          </a:prstGeom>
+          <a:noFill/>
+        </p:spPr>
+      </p:pic>
+    </p:spTree>
+  </p:cSld>
+  <p:clrMapOvr>
+    <a:masterClrMapping/>
+  </p:clrMapOvr>
+</p:sld>
+</file>
+
+<file path=ppt/slides/slide4.xml><?xml version="1.0" encoding="utf-8"?>
+<p:sld xmlns:a="http://schemas.openxmlformats.org/drawingml/2006/main" xmlns:r="http://schemas.openxmlformats.org/officeDocument/2006/relationships" xmlns:p="http://schemas.openxmlformats.org/presentationml/2006/main">
+  <p:cSld>
+    <p:spTree>
+      <p:nvGrpSpPr>
+        <p:cNvPr id="1" name=""/>
+        <p:cNvGrpSpPr/>
+        <p:nvPr/>
+      </p:nvGrpSpPr>
+      <p:grpSpPr>
+        <a:xfrm>
+          <a:off x="0" y="0"/>
+          <a:ext cx="0" cy="0"/>
+          <a:chOff x="0" y="0"/>
+          <a:chExt cx="0" cy="0"/>
+        </a:xfrm>
+      </p:grpSpPr>
+      <p:pic>
+        <p:nvPicPr>
+          <p:cNvPr id="2051" name="Picture 3" descr="C:\Users\woodstock\Documents\grad\Thesis\code\sem\matlab\comparison_of_cond-prob-distr_tns-layerF.png"/>
+          <p:cNvPicPr>
+            <a:picLocks noChangeAspect="1" noChangeArrowheads="1"/>
+          </p:cNvPicPr>
+          <p:nvPr/>
+        </p:nvPicPr>
+        <p:blipFill>
+          <a:blip r:embed="rId3" cstate="print"/>
+          <a:srcRect l="3626" r="8630"/>
+          <a:stretch>
+            <a:fillRect/>
+          </a:stretch>
+        </p:blipFill>
+        <p:spPr bwMode="auto">
+          <a:xfrm>
+            <a:off x="0" y="1066800"/>
+            <a:ext cx="4648200" cy="3973513"/>
+          </a:xfrm>
+          <a:prstGeom prst="rect">
+            <a:avLst/>
+          </a:prstGeom>
+          <a:noFill/>
+        </p:spPr>
+      </p:pic>
+      <p:pic>
+        <p:nvPicPr>
+          <p:cNvPr id="2050" name="Picture 2" descr="C:\Users\woodstock\Documents\grad\Thesis\code\sem\matlab\comparison_of_cond-prob-distr_tns-layerZ.png"/>
+          <p:cNvPicPr>
+            <a:picLocks noChangeAspect="1" noChangeArrowheads="1"/>
+          </p:cNvPicPr>
+          <p:nvPr/>
+        </p:nvPicPr>
+        <p:blipFill>
+          <a:blip r:embed="rId4" cstate="print"/>
+          <a:srcRect l="7941" r="7192"/>
+          <a:stretch>
+            <a:fillRect/>
+          </a:stretch>
+        </p:blipFill>
+        <p:spPr bwMode="auto">
+          <a:xfrm>
+            <a:off x="4648200" y="1066800"/>
+            <a:ext cx="4495800" cy="3973513"/>
+          </a:xfrm>
+          <a:prstGeom prst="rect">
+            <a:avLst/>
+          </a:prstGeom>
+          <a:noFill/>
+        </p:spPr>
+      </p:pic>
+      <p:graphicFrame>
+        <p:nvGraphicFramePr>
+          <p:cNvPr id="8" name="Object 7"/>
+          <p:cNvGraphicFramePr>
+            <a:graphicFrameLocks noChangeAspect="1"/>
+          </p:cNvGraphicFramePr>
+          <p:nvPr/>
+        </p:nvGraphicFramePr>
+        <p:xfrm>
+          <a:off x="4495800" y="3327400"/>
+          <a:ext cx="152400" cy="203200"/>
+        </p:xfrm>
+        <a:graphic>
+          <a:graphicData uri="http://schemas.openxmlformats.org/presentationml/2006/ole">
+            <p:oleObj spid="_x0000_s2052" name="Equation" r:id="rId5" imgW="152280" imgH="203040" progId="Equation.3">
+              <p:embed/>
+            </p:oleObj>
+          </a:graphicData>
+        </a:graphic>
+      </p:graphicFrame>
+      <p:graphicFrame>
+        <p:nvGraphicFramePr>
+          <p:cNvPr id="9" name="Object 8"/>
+          <p:cNvGraphicFramePr>
+            <a:graphicFrameLocks noChangeAspect="1"/>
+          </p:cNvGraphicFramePr>
+          <p:nvPr/>
+        </p:nvGraphicFramePr>
+        <p:xfrm>
+          <a:off x="4495800" y="3327400"/>
+          <a:ext cx="152400" cy="203200"/>
+        </p:xfrm>
+        <a:graphic>
+          <a:graphicData uri="http://schemas.openxmlformats.org/presentationml/2006/ole">
+            <p:oleObj spid="_x0000_s2053" name="Equation" r:id="rId6" imgW="152280" imgH="203040" progId="Equation.3">
+              <p:embed/>
+            </p:oleObj>
+          </a:graphicData>
+        </a:graphic>
+      </p:graphicFrame>
+      <p:graphicFrame>
+        <p:nvGraphicFramePr>
+          <p:cNvPr id="2054" name="Object 6"/>
+          <p:cNvGraphicFramePr>
+            <a:graphicFrameLocks noChangeAspect="1"/>
+          </p:cNvGraphicFramePr>
+          <p:nvPr/>
+        </p:nvGraphicFramePr>
+        <p:xfrm>
+          <a:off x="2362200" y="4953000"/>
+          <a:ext cx="381000" cy="508000"/>
+        </p:xfrm>
+        <a:graphic>
+          <a:graphicData uri="http://schemas.openxmlformats.org/presentationml/2006/ole">
+            <p:oleObj spid="_x0000_s2054" name="Equation" r:id="rId7" imgW="152280" imgH="203040" progId="Equation.3">
+              <p:embed/>
+            </p:oleObj>
+          </a:graphicData>
+        </a:graphic>
+      </p:graphicFrame>
+      <p:graphicFrame>
+        <p:nvGraphicFramePr>
+          <p:cNvPr id="2056" name="Object 8"/>
+          <p:cNvGraphicFramePr>
+            <a:graphicFrameLocks noChangeAspect="1"/>
+          </p:cNvGraphicFramePr>
+          <p:nvPr/>
+        </p:nvGraphicFramePr>
+        <p:xfrm>
+          <a:off x="6858000" y="5029200"/>
+          <a:ext cx="285750" cy="317500"/>
+        </p:xfrm>
+        <a:graphic>
+          <a:graphicData uri="http://schemas.openxmlformats.org/presentationml/2006/ole">
+            <p:oleObj spid="_x0000_s2056" name="Equation" r:id="rId8" imgW="114120" imgH="126720" progId="Equation.3">
+              <p:embed/>
+            </p:oleObj>
+          </a:graphicData>
+        </a:graphic>
+      </p:graphicFrame>
     </p:spTree>
   </p:cSld>
   <p:clrMapOvr>
@@ -3658,4 +4288,287 @@
   <a:objectDefaults/>
   <a:extraClrSchemeLst/>
 </a:theme>
+</file>
+
+<file path=ppt/theme/theme2.xml><?xml version="1.0" encoding="utf-8"?>
+<a:theme xmlns:a="http://schemas.openxmlformats.org/drawingml/2006/main" name="Office Theme">
+  <a:themeElements>
+    <a:clrScheme name="Office">
+      <a:dk1>
+        <a:sysClr val="windowText" lastClr="000000"/>
+      </a:dk1>
+      <a:lt1>
+        <a:sysClr val="window" lastClr="FFFFFF"/>
+      </a:lt1>
+      <a:dk2>
+        <a:srgbClr val="1F497D"/>
+      </a:dk2>
+      <a:lt2>
+        <a:srgbClr val="EEECE1"/>
+      </a:lt2>
+      <a:accent1>
+        <a:srgbClr val="4F81BD"/>
+      </a:accent1>
+      <a:accent2>
+        <a:srgbClr val="C0504D"/>
+      </a:accent2>
+      <a:accent3>
+        <a:srgbClr val="9BBB59"/>
+      </a:accent3>
+      <a:accent4>
+        <a:srgbClr val="8064A2"/>
+      </a:accent4>
+      <a:accent5>
+        <a:srgbClr val="4BACC6"/>
+      </a:accent5>
+      <a:accent6>
+        <a:srgbClr val="F79646"/>
+      </a:accent6>
+      <a:hlink>
+        <a:srgbClr val="0000FF"/>
+      </a:hlink>
+      <a:folHlink>
+        <a:srgbClr val="800080"/>
+      </a:folHlink>
+    </a:clrScheme>
+    <a:fontScheme name="Office">
+      <a:majorFont>
+        <a:latin typeface="Calibri"/>
+        <a:ea typeface=""/>
+        <a:cs typeface=""/>
+        <a:font script="Jpan" typeface="ＭＳ Ｐゴシック"/>
+        <a:font script="Hang" typeface="맑은 고딕"/>
+        <a:font script="Hans" typeface="宋体"/>
+        <a:font script="Hant" typeface="新細明體"/>
+        <a:font script="Arab" typeface="Times New Roman"/>
+        <a:font script="Hebr" typeface="Times New Roman"/>
+        <a:font script="Thai" typeface="Angsana New"/>
+        <a:font script="Ethi" typeface="Nyala"/>
+        <a:font script="Beng" typeface="Vrinda"/>
+        <a:font script="Gujr" typeface="Shruti"/>
+        <a:font script="Khmr" typeface="MoolBoran"/>
+        <a:font script="Knda" typeface="Tunga"/>
+        <a:font script="Guru" typeface="Raavi"/>
+        <a:font script="Cans" typeface="Euphemia"/>
+        <a:font script="Cher" typeface="Plantagenet Cherokee"/>
+        <a:font script="Yiii" typeface="Microsoft Yi Baiti"/>
+        <a:font script="Tibt" typeface="Microsoft Himalaya"/>
+        <a:font script="Thaa" typeface="MV Boli"/>
+        <a:font script="Deva" typeface="Mangal"/>
+        <a:font script="Telu" typeface="Gautami"/>
+        <a:font script="Taml" typeface="Latha"/>
+        <a:font script="Syrc" typeface="Estrangelo Edessa"/>
+        <a:font script="Orya" typeface="Kalinga"/>
+        <a:font script="Mlym" typeface="Kartika"/>
+        <a:font script="Laoo" typeface="DokChampa"/>
+        <a:font script="Sinh" typeface="Iskoola Pota"/>
+        <a:font script="Mong" typeface="Mongolian Baiti"/>
+        <a:font script="Viet" typeface="Times New Roman"/>
+        <a:font script="Uigh" typeface="Microsoft Uighur"/>
+      </a:majorFont>
+      <a:minorFont>
+        <a:latin typeface="Calibri"/>
+        <a:ea typeface=""/>
+        <a:cs typeface=""/>
+        <a:font script="Jpan" typeface="ＭＳ Ｐゴシック"/>
+        <a:font script="Hang" typeface="맑은 고딕"/>
+        <a:font script="Hans" typeface="宋体"/>
+        <a:font script="Hant" typeface="新細明體"/>
+        <a:font script="Arab" typeface="Arial"/>
+        <a:font script="Hebr" typeface="Arial"/>
+        <a:font script="Thai" typeface="Cordia New"/>
+        <a:font script="Ethi" typeface="Nyala"/>
+        <a:font script="Beng" typeface="Vrinda"/>
+        <a:font script="Gujr" typeface="Shruti"/>
+        <a:font script="Khmr" typeface="DaunPenh"/>
+        <a:font script="Knda" typeface="Tunga"/>
+        <a:font script="Guru" typeface="Raavi"/>
+        <a:font script="Cans" typeface="Euphemia"/>
+        <a:font script="Cher" typeface="Plantagenet Cherokee"/>
+        <a:font script="Yiii" typeface="Microsoft Yi Baiti"/>
+        <a:font script="Tibt" typeface="Microsoft Himalaya"/>
+        <a:font script="Thaa" typeface="MV Boli"/>
+        <a:font script="Deva" typeface="Mangal"/>
+        <a:font script="Telu" typeface="Gautami"/>
+        <a:font script="Taml" typeface="Latha"/>
+        <a:font script="Syrc" typeface="Estrangelo Edessa"/>
+        <a:font script="Orya" typeface="Kalinga"/>
+        <a:font script="Mlym" typeface="Kartika"/>
+        <a:font script="Laoo" typeface="DokChampa"/>
+        <a:font script="Sinh" typeface="Iskoola Pota"/>
+        <a:font script="Mong" typeface="Mongolian Baiti"/>
+        <a:font script="Viet" typeface="Arial"/>
+        <a:font script="Uigh" typeface="Microsoft Uighur"/>
+      </a:minorFont>
+    </a:fontScheme>
+    <a:fmtScheme name="Office">
+      <a:fillStyleLst>
+        <a:solidFill>
+          <a:schemeClr val="phClr"/>
+        </a:solidFill>
+        <a:gradFill rotWithShape="1">
+          <a:gsLst>
+            <a:gs pos="0">
+              <a:schemeClr val="phClr">
+                <a:tint val="50000"/>
+                <a:satMod val="300000"/>
+              </a:schemeClr>
+            </a:gs>
+            <a:gs pos="35000">
+              <a:schemeClr val="phClr">
+                <a:tint val="37000"/>
+                <a:satMod val="300000"/>
+              </a:schemeClr>
+            </a:gs>
+            <a:gs pos="100000">
+              <a:schemeClr val="phClr">
+                <a:tint val="15000"/>
+                <a:satMod val="350000"/>
+              </a:schemeClr>
+            </a:gs>
+          </a:gsLst>
+          <a:lin ang="16200000" scaled="1"/>
+        </a:gradFill>
+        <a:gradFill rotWithShape="1">
+          <a:gsLst>
+            <a:gs pos="0">
+              <a:schemeClr val="phClr">
+                <a:shade val="51000"/>
+                <a:satMod val="130000"/>
+              </a:schemeClr>
+            </a:gs>
+            <a:gs pos="80000">
+              <a:schemeClr val="phClr">
+                <a:shade val="93000"/>
+                <a:satMod val="130000"/>
+              </a:schemeClr>
+            </a:gs>
+            <a:gs pos="100000">
+              <a:schemeClr val="phClr">
+                <a:shade val="94000"/>
+                <a:satMod val="135000"/>
+              </a:schemeClr>
+            </a:gs>
+          </a:gsLst>
+          <a:lin ang="16200000" scaled="0"/>
+        </a:gradFill>
+      </a:fillStyleLst>
+      <a:lnStyleLst>
+        <a:ln w="9525" cap="flat" cmpd="sng" algn="ctr">
+          <a:solidFill>
+            <a:schemeClr val="phClr">
+              <a:shade val="95000"/>
+              <a:satMod val="105000"/>
+            </a:schemeClr>
+          </a:solidFill>
+          <a:prstDash val="solid"/>
+        </a:ln>
+        <a:ln w="25400" cap="flat" cmpd="sng" algn="ctr">
+          <a:solidFill>
+            <a:schemeClr val="phClr"/>
+          </a:solidFill>
+          <a:prstDash val="solid"/>
+        </a:ln>
+        <a:ln w="38100" cap="flat" cmpd="sng" algn="ctr">
+          <a:solidFill>
+            <a:schemeClr val="phClr"/>
+          </a:solidFill>
+          <a:prstDash val="solid"/>
+        </a:ln>
+      </a:lnStyleLst>
+      <a:effectStyleLst>
+        <a:effectStyle>
+          <a:effectLst>
+            <a:outerShdw blurRad="40000" dist="20000" dir="5400000" rotWithShape="0">
+              <a:srgbClr val="000000">
+                <a:alpha val="38000"/>
+              </a:srgbClr>
+            </a:outerShdw>
+          </a:effectLst>
+        </a:effectStyle>
+        <a:effectStyle>
+          <a:effectLst>
+            <a:outerShdw blurRad="40000" dist="23000" dir="5400000" rotWithShape="0">
+              <a:srgbClr val="000000">
+                <a:alpha val="35000"/>
+              </a:srgbClr>
+            </a:outerShdw>
+          </a:effectLst>
+        </a:effectStyle>
+        <a:effectStyle>
+          <a:effectLst>
+            <a:outerShdw blurRad="40000" dist="23000" dir="5400000" rotWithShape="0">
+              <a:srgbClr val="000000">
+                <a:alpha val="35000"/>
+              </a:srgbClr>
+            </a:outerShdw>
+          </a:effectLst>
+          <a:scene3d>
+            <a:camera prst="orthographicFront">
+              <a:rot lat="0" lon="0" rev="0"/>
+            </a:camera>
+            <a:lightRig rig="threePt" dir="t">
+              <a:rot lat="0" lon="0" rev="1200000"/>
+            </a:lightRig>
+          </a:scene3d>
+          <a:sp3d>
+            <a:bevelT w="63500" h="25400"/>
+          </a:sp3d>
+        </a:effectStyle>
+      </a:effectStyleLst>
+      <a:bgFillStyleLst>
+        <a:solidFill>
+          <a:schemeClr val="phClr"/>
+        </a:solidFill>
+        <a:gradFill rotWithShape="1">
+          <a:gsLst>
+            <a:gs pos="0">
+              <a:schemeClr val="phClr">
+                <a:tint val="40000"/>
+                <a:satMod val="350000"/>
+              </a:schemeClr>
+            </a:gs>
+            <a:gs pos="40000">
+              <a:schemeClr val="phClr">
+                <a:tint val="45000"/>
+                <a:shade val="99000"/>
+                <a:satMod val="350000"/>
+              </a:schemeClr>
+            </a:gs>
+            <a:gs pos="100000">
+              <a:schemeClr val="phClr">
+                <a:shade val="20000"/>
+                <a:satMod val="255000"/>
+              </a:schemeClr>
+            </a:gs>
+          </a:gsLst>
+          <a:path path="circle">
+            <a:fillToRect l="50000" t="-80000" r="50000" b="180000"/>
+          </a:path>
+        </a:gradFill>
+        <a:gradFill rotWithShape="1">
+          <a:gsLst>
+            <a:gs pos="0">
+              <a:schemeClr val="phClr">
+                <a:tint val="80000"/>
+                <a:satMod val="300000"/>
+              </a:schemeClr>
+            </a:gs>
+            <a:gs pos="100000">
+              <a:schemeClr val="phClr">
+                <a:shade val="30000"/>
+                <a:satMod val="200000"/>
+              </a:schemeClr>
+            </a:gs>
+          </a:gsLst>
+          <a:path path="circle">
+            <a:fillToRect l="50000" t="50000" r="50000" b="50000"/>
+          </a:path>
+        </a:gradFill>
+      </a:bgFillStyleLst>
+    </a:fmtScheme>
+  </a:themeElements>
+  <a:objectDefaults/>
+  <a:extraClrSchemeLst/>
+</a:theme>
 </file>
</xml_diff>

<commit_message>
-more figures -discussion -proof reading -reference fix
</commit_message>
<xml_diff>
--- a/latex/figures/figures.pptx
+++ b/latex/figures/figures.pptx
@@ -5,13 +5,14 @@
     <p:sldMasterId id="2147483648" r:id="rId1"/>
   </p:sldMasterIdLst>
   <p:notesMasterIdLst>
-    <p:notesMasterId r:id="rId6"/>
+    <p:notesMasterId r:id="rId7"/>
   </p:notesMasterIdLst>
   <p:sldIdLst>
     <p:sldId id="256" r:id="rId2"/>
     <p:sldId id="257" r:id="rId3"/>
     <p:sldId id="258" r:id="rId4"/>
     <p:sldId id="259" r:id="rId5"/>
+    <p:sldId id="260" r:id="rId6"/>
   </p:sldIdLst>
   <p:sldSz cx="9144000" cy="6858000" type="screen4x3"/>
   <p:notesSz cx="6858000" cy="9144000"/>
@@ -195,6 +196,7 @@
           <a:p>
             <a:fld id="{AAC99F76-CD5B-4362-8864-1A7FF77C9707}" type="datetimeFigureOut">
               <a:rPr lang="en-US" smtClean="0"/>
+              <a:pPr/>
               <a:t>03-Aug-13</a:t>
             </a:fld>
             <a:endParaRPr lang="en-US"/>
@@ -356,6 +358,7 @@
           <a:p>
             <a:fld id="{57385444-732E-4196-8780-F1396E368759}" type="slidenum">
               <a:rPr lang="en-US" smtClean="0"/>
+              <a:pPr/>
               <a:t>‹#›</a:t>
             </a:fld>
             <a:endParaRPr lang="en-US"/>
@@ -3999,6 +4002,83 @@
           </a:graphicData>
         </a:graphic>
       </p:graphicFrame>
+    </p:spTree>
+  </p:cSld>
+  <p:clrMapOvr>
+    <a:masterClrMapping/>
+  </p:clrMapOvr>
+</p:sld>
+</file>
+
+<file path=ppt/slides/slide5.xml><?xml version="1.0" encoding="utf-8"?>
+<p:sld xmlns:a="http://schemas.openxmlformats.org/drawingml/2006/main" xmlns:r="http://schemas.openxmlformats.org/officeDocument/2006/relationships" xmlns:p="http://schemas.openxmlformats.org/presentationml/2006/main">
+  <p:cSld>
+    <p:spTree>
+      <p:nvGrpSpPr>
+        <p:cNvPr id="1" name=""/>
+        <p:cNvGrpSpPr/>
+        <p:nvPr/>
+      </p:nvGrpSpPr>
+      <p:grpSpPr>
+        <a:xfrm>
+          <a:off x="0" y="0"/>
+          <a:ext cx="0" cy="0"/>
+          <a:chOff x="0" y="0"/>
+          <a:chExt cx="0" cy="0"/>
+        </a:xfrm>
+      </p:grpSpPr>
+      <p:pic>
+        <p:nvPicPr>
+          <p:cNvPr id="19458" name="Picture 2" descr="C:\Users\woodstock\Documents\grad\Thesis\code\sem\matlab\prediction_stats_heat_layerF.png"/>
+          <p:cNvPicPr>
+            <a:picLocks noChangeAspect="1" noChangeArrowheads="1"/>
+          </p:cNvPicPr>
+          <p:nvPr/>
+        </p:nvPicPr>
+        <p:blipFill>
+          <a:blip r:embed="rId2" cstate="print"/>
+          <a:srcRect l="37774" t="3692" r="31661" b="51403"/>
+          <a:stretch>
+            <a:fillRect/>
+          </a:stretch>
+        </p:blipFill>
+        <p:spPr bwMode="auto">
+          <a:xfrm>
+            <a:off x="0" y="1600200"/>
+            <a:ext cx="4736757" cy="3505200"/>
+          </a:xfrm>
+          <a:prstGeom prst="rect">
+            <a:avLst/>
+          </a:prstGeom>
+          <a:noFill/>
+        </p:spPr>
+      </p:pic>
+      <p:pic>
+        <p:nvPicPr>
+          <p:cNvPr id="19459" name="Picture 3" descr="C:\Users\woodstock\Documents\grad\Thesis\code\sem\matlab\prediction_stats_kl_layerF.png"/>
+          <p:cNvPicPr>
+            <a:picLocks noChangeAspect="1" noChangeArrowheads="1"/>
+          </p:cNvPicPr>
+          <p:nvPr/>
+        </p:nvPicPr>
+        <p:blipFill>
+          <a:blip r:embed="rId3" cstate="print"/>
+          <a:srcRect l="23370" t="1972" r="26503" b="3363"/>
+          <a:stretch>
+            <a:fillRect/>
+          </a:stretch>
+        </p:blipFill>
+        <p:spPr bwMode="auto">
+          <a:xfrm>
+            <a:off x="4978401" y="1371600"/>
+            <a:ext cx="4165599" cy="3962399"/>
+          </a:xfrm>
+          <a:prstGeom prst="rect">
+            <a:avLst/>
+          </a:prstGeom>
+          <a:noFill/>
+        </p:spPr>
+      </p:pic>
     </p:spTree>
   </p:cSld>
   <p:clrMapOvr>

</xml_diff>